<commit_message>
updated slide and poster
</commit_message>
<xml_diff>
--- a/docs/projet_bachelor/slides/ceremonie_diplome/ISC_EMB_ceremonie_diplome_Kandiah_Upegui_2024.pptx
+++ b/docs/projet_bachelor/slides/ceremonie_diplome/ISC_EMB_ceremonie_diplome_Kandiah_Upegui_2024.pptx
@@ -226,7 +226,7 @@
           <a:p>
             <a:fld id="{7DE35D8A-043F-1A4C-8755-955935A64998}" type="datetimeFigureOut">
               <a:rPr lang="fr-FR" smtClean="0"/>
-              <a:t>26/08/2024</a:t>
+              <a:t>28/08/2024</a:t>
             </a:fld>
             <a:endParaRPr lang="fr-FR"/>
           </a:p>
@@ -403,7 +403,7 @@
           <a:p>
             <a:fld id="{EDB78CA8-3C0C-450E-A9A8-1BF427B2CF19}" type="datetimeFigureOut">
               <a:rPr lang="fr-CH" smtClean="0"/>
-              <a:t>26.08.2024</a:t>
+              <a:t>28.08.2024</a:t>
             </a:fld>
             <a:endParaRPr lang="fr-CH"/>
           </a:p>
@@ -1925,31 +1925,42 @@
           </a:p>
         </p:txBody>
       </p:sp>
-      <p:sp>
-        <p:nvSpPr>
-          <p:cNvPr id="3" name="Picture Placeholder 2">
+      <p:pic>
+        <p:nvPicPr>
+          <p:cNvPr id="7" name="Espace réservé pour une image  6">
             <a:extLst>
               <a:ext uri="{FF2B5EF4-FFF2-40B4-BE49-F238E27FC236}">
-                <a16:creationId xmlns:a16="http://schemas.microsoft.com/office/drawing/2014/main" id="{57B47499-53E6-9055-59C7-28C35A021B55}"/>
+                <a16:creationId xmlns:a16="http://schemas.microsoft.com/office/drawing/2014/main" id="{0DDF93A9-2DAB-F1EC-6A5E-EFE4DAE46D7F}"/>
               </a:ext>
             </a:extLst>
           </p:cNvPr>
-          <p:cNvSpPr>
-            <a:spLocks noGrp="1"/>
-          </p:cNvSpPr>
+          <p:cNvPicPr>
+            <a:picLocks noGrp="1" noChangeAspect="1"/>
+          </p:cNvPicPr>
           <p:nvPr>
             <p:ph type="pic" sz="quarter" idx="13"/>
           </p:nvPr>
-        </p:nvSpPr>
-        <p:spPr/>
-        <p:txBody>
-          <a:bodyPr/>
-          <a:lstStyle/>
-          <a:p>
-            <a:endParaRPr lang="fr-FR" dirty="0"/>
-          </a:p>
-        </p:txBody>
-      </p:sp>
+        </p:nvPicPr>
+        <p:blipFill>
+          <a:blip r:embed="rId3" cstate="print">
+            <a:extLst>
+              <a:ext uri="{28A0092B-C50C-407E-A947-70E740481C1C}">
+                <a14:useLocalDpi xmlns:a14="http://schemas.microsoft.com/office/drawing/2010/main" val="0"/>
+              </a:ext>
+            </a:extLst>
+          </a:blip>
+          <a:srcRect l="12606" r="12606"/>
+          <a:stretch>
+            <a:fillRect/>
+          </a:stretch>
+        </p:blipFill>
+        <p:spPr>
+          <a:xfrm rot="5400000">
+            <a:off x="5405438" y="2932113"/>
+            <a:ext cx="1123950" cy="1127125"/>
+          </a:xfrm>
+        </p:spPr>
+      </p:pic>
       <p:sp>
         <p:nvSpPr>
           <p:cNvPr id="11" name="Titre 3">

</xml_diff>